<commit_message>
Commit correction of PPT and project
</commit_message>
<xml_diff>
--- a/pythonBeginnerLecture/PythonPart5.pptx
+++ b/pythonBeginnerLecture/PythonPart5.pptx
@@ -5,10 +5,10 @@
     <p:sldMasterId id="2147483660" r:id="rId1"/>
   </p:sldMasterIdLst>
   <p:notesMasterIdLst>
-    <p:notesMasterId r:id="rId19"/>
+    <p:notesMasterId r:id="rId20"/>
   </p:notesMasterIdLst>
   <p:handoutMasterIdLst>
-    <p:handoutMasterId r:id="rId20"/>
+    <p:handoutMasterId r:id="rId21"/>
   </p:handoutMasterIdLst>
   <p:sldIdLst>
     <p:sldId id="256" r:id="rId2"/>
@@ -27,12 +27,13 @@
     <p:sldId id="339" r:id="rId15"/>
     <p:sldId id="340" r:id="rId16"/>
     <p:sldId id="341" r:id="rId17"/>
-    <p:sldId id="305" r:id="rId18"/>
+    <p:sldId id="342" r:id="rId18"/>
+    <p:sldId id="305" r:id="rId19"/>
   </p:sldIdLst>
   <p:sldSz cx="12192000" cy="6858000"/>
   <p:notesSz cx="6858000" cy="9144000"/>
   <p:custDataLst>
-    <p:tags r:id="rId21"/>
+    <p:tags r:id="rId22"/>
   </p:custDataLst>
   <p:defaultTextStyle>
     <a:defPPr>
@@ -265,7 +266,7 @@
           <a:p>
             <a:fld id="{C075C123-D6CD-4046-9E13-CA7186604EF0}" type="datetimeFigureOut">
               <a:rPr lang="zh-CN" altLang="en-US" smtClean="0"/>
-              <a:t>2021/1/1</a:t>
+              <a:t>2021/1/2</a:t>
             </a:fld>
             <a:endParaRPr lang="zh-CN" altLang="en-US"/>
           </a:p>
@@ -430,7 +431,7 @@
           <a:p>
             <a:fld id="{9E26DC34-D585-42D5-89F7-991AD639A885}" type="datetimeFigureOut">
               <a:rPr lang="zh-CN" altLang="en-US" smtClean="0"/>
-              <a:t>2021/1/1</a:t>
+              <a:t>2021/1/2</a:t>
             </a:fld>
             <a:endParaRPr lang="zh-CN" altLang="en-US"/>
           </a:p>
@@ -1480,6 +1481,95 @@
             <a:fld id="{F1E2743B-58E3-4952-98AC-60B7F3305738}" type="slidenum">
               <a:rPr lang="zh-CN" altLang="en-US" smtClean="0"/>
               <a:t>17</a:t>
+            </a:fld>
+            <a:endParaRPr lang="zh-CN" altLang="en-US"/>
+          </a:p>
+        </p:txBody>
+      </p:sp>
+    </p:spTree>
+    <p:extLst>
+      <p:ext uri="{BB962C8B-B14F-4D97-AF65-F5344CB8AC3E}">
+        <p14:creationId xmlns:p14="http://schemas.microsoft.com/office/powerpoint/2010/main" val="1631314194"/>
+      </p:ext>
+    </p:extLst>
+  </p:cSld>
+  <p:clrMapOvr>
+    <a:masterClrMapping/>
+  </p:clrMapOvr>
+</p:notes>
+</file>
+
+<file path=ppt/notesSlides/notesSlide18.xml><?xml version="1.0" encoding="utf-8"?>
+<p:notes xmlns:a="http://schemas.openxmlformats.org/drawingml/2006/main" xmlns:r="http://schemas.openxmlformats.org/officeDocument/2006/relationships" xmlns:p="http://schemas.openxmlformats.org/presentationml/2006/main">
+  <p:cSld>
+    <p:spTree>
+      <p:nvGrpSpPr>
+        <p:cNvPr id="1" name=""/>
+        <p:cNvGrpSpPr/>
+        <p:nvPr/>
+      </p:nvGrpSpPr>
+      <p:grpSpPr>
+        <a:xfrm>
+          <a:off x="0" y="0"/>
+          <a:ext cx="0" cy="0"/>
+          <a:chOff x="0" y="0"/>
+          <a:chExt cx="0" cy="0"/>
+        </a:xfrm>
+      </p:grpSpPr>
+      <p:sp>
+        <p:nvSpPr>
+          <p:cNvPr id="2" name="幻灯片图像占位符 1"/>
+          <p:cNvSpPr>
+            <a:spLocks noGrp="1" noRot="1" noChangeAspect="1"/>
+          </p:cNvSpPr>
+          <p:nvPr>
+            <p:ph type="sldImg"/>
+          </p:nvPr>
+        </p:nvSpPr>
+        <p:spPr>
+          <a:xfrm>
+            <a:off x="228600" y="630238"/>
+            <a:ext cx="5486400" cy="3086100"/>
+          </a:xfrm>
+        </p:spPr>
+      </p:sp>
+      <p:sp>
+        <p:nvSpPr>
+          <p:cNvPr id="3" name="备注占位符 2"/>
+          <p:cNvSpPr>
+            <a:spLocks noGrp="1"/>
+          </p:cNvSpPr>
+          <p:nvPr>
+            <p:ph type="body" idx="1"/>
+          </p:nvPr>
+        </p:nvSpPr>
+        <p:spPr/>
+        <p:txBody>
+          <a:bodyPr/>
+          <a:lstStyle/>
+          <a:p>
+            <a:endParaRPr lang="zh-CN" altLang="en-US"/>
+          </a:p>
+        </p:txBody>
+      </p:sp>
+      <p:sp>
+        <p:nvSpPr>
+          <p:cNvPr id="4" name="灯片编号占位符 3"/>
+          <p:cNvSpPr>
+            <a:spLocks noGrp="1"/>
+          </p:cNvSpPr>
+          <p:nvPr>
+            <p:ph type="sldNum" sz="quarter" idx="10"/>
+          </p:nvPr>
+        </p:nvSpPr>
+        <p:spPr/>
+        <p:txBody>
+          <a:bodyPr/>
+          <a:lstStyle/>
+          <a:p>
+            <a:fld id="{F1E2743B-58E3-4952-98AC-60B7F3305738}" type="slidenum">
+              <a:rPr lang="zh-CN" altLang="en-US" smtClean="0"/>
+              <a:t>18</a:t>
             </a:fld>
             <a:endParaRPr lang="zh-CN" altLang="en-US"/>
           </a:p>
@@ -14035,7 +14125,7 @@
           </a:ln>
           <a:extLst>
             <a:ext uri="{C572A759-6A51-4108-AA02-DFA0A04FC94B}">
-              <ma14:wrappingTextBoxFlag xmlns="" xmlns:ma14="http://schemas.microsoft.com/office/mac/drawingml/2011/main" val="1"/>
+              <ma14:wrappingTextBoxFlag xmlns:ma14="http://schemas.microsoft.com/office/mac/drawingml/2011/main" xmlns="" val="1"/>
             </a:ext>
           </a:extLst>
         </p:spPr>
@@ -16552,7 +16642,7 @@
           </a:ln>
           <a:extLst>
             <a:ext uri="{C572A759-6A51-4108-AA02-DFA0A04FC94B}">
-              <ma14:wrappingTextBoxFlag xmlns="" xmlns:ma14="http://schemas.microsoft.com/office/mac/drawingml/2011/main" val="1"/>
+              <ma14:wrappingTextBoxFlag xmlns:ma14="http://schemas.microsoft.com/office/mac/drawingml/2011/main" xmlns="" val="1"/>
             </a:ext>
           </a:extLst>
         </p:spPr>
@@ -16939,7 +17029,7 @@
           </a:ln>
           <a:extLst>
             <a:ext uri="{C572A759-6A51-4108-AA02-DFA0A04FC94B}">
-              <ma14:wrappingTextBoxFlag xmlns="" xmlns:ma14="http://schemas.microsoft.com/office/mac/drawingml/2011/main" val="1"/>
+              <ma14:wrappingTextBoxFlag xmlns:ma14="http://schemas.microsoft.com/office/mac/drawingml/2011/main" xmlns="" val="1"/>
             </a:ext>
           </a:extLst>
         </p:spPr>
@@ -17255,7 +17345,7 @@
           </a:ln>
           <a:extLst>
             <a:ext uri="{C572A759-6A51-4108-AA02-DFA0A04FC94B}">
-              <ma14:wrappingTextBoxFlag xmlns="" xmlns:ma14="http://schemas.microsoft.com/office/mac/drawingml/2011/main" val="1"/>
+              <ma14:wrappingTextBoxFlag xmlns:ma14="http://schemas.microsoft.com/office/mac/drawingml/2011/main" xmlns="" val="1"/>
             </a:ext>
           </a:extLst>
         </p:spPr>
@@ -17599,7 +17689,7 @@
           </a:ln>
           <a:extLst>
             <a:ext uri="{C572A759-6A51-4108-AA02-DFA0A04FC94B}">
-              <ma14:wrappingTextBoxFlag xmlns="" xmlns:ma14="http://schemas.microsoft.com/office/mac/drawingml/2011/main" val="1"/>
+              <ma14:wrappingTextBoxFlag xmlns:ma14="http://schemas.microsoft.com/office/mac/drawingml/2011/main" xmlns="" val="1"/>
             </a:ext>
           </a:extLst>
         </p:spPr>
@@ -18718,6 +18808,345 @@
 </file>
 
 <file path=ppt/slides/slide17.xml><?xml version="1.0" encoding="utf-8"?>
+<p:sld xmlns:a="http://schemas.openxmlformats.org/drawingml/2006/main" xmlns:r="http://schemas.openxmlformats.org/officeDocument/2006/relationships" xmlns:p="http://schemas.openxmlformats.org/presentationml/2006/main">
+  <p:cSld>
+    <p:spTree>
+      <p:nvGrpSpPr>
+        <p:cNvPr id="1" name=""/>
+        <p:cNvGrpSpPr/>
+        <p:nvPr/>
+      </p:nvGrpSpPr>
+      <p:grpSpPr>
+        <a:xfrm>
+          <a:off x="0" y="0"/>
+          <a:ext cx="0" cy="0"/>
+          <a:chOff x="0" y="0"/>
+          <a:chExt cx="0" cy="0"/>
+        </a:xfrm>
+      </p:grpSpPr>
+      <p:sp>
+        <p:nvSpPr>
+          <p:cNvPr id="4" name="Shape 1915">
+            <a:extLst>
+              <a:ext uri="{FF2B5EF4-FFF2-40B4-BE49-F238E27FC236}">
+                <a16:creationId xmlns:a16="http://schemas.microsoft.com/office/drawing/2014/main" id="{920CC6A3-E53E-4B97-8A37-121599AC8870}"/>
+              </a:ext>
+            </a:extLst>
+          </p:cNvPr>
+          <p:cNvSpPr/>
+          <p:nvPr>
+            <p:custDataLst>
+              <p:tags r:id="rId1"/>
+            </p:custDataLst>
+          </p:nvPr>
+        </p:nvSpPr>
+        <p:spPr>
+          <a:xfrm>
+            <a:off x="1216163" y="2733632"/>
+            <a:ext cx="10170368" cy="3033010"/>
+          </a:xfrm>
+          <a:prstGeom prst="rect">
+            <a:avLst/>
+          </a:prstGeom>
+          <a:ln w="12700">
+            <a:miter lim="400000"/>
+          </a:ln>
+          <a:extLst>
+            <a:ext uri="{C572A759-6A51-4108-AA02-DFA0A04FC94B}">
+              <ma14:wrappingTextBoxFlag xmlns:ma14="http://schemas.microsoft.com/office/mac/drawingml/2011/main" xmlns="" val="1"/>
+            </a:ext>
+          </a:extLst>
+        </p:spPr>
+        <p:txBody>
+          <a:bodyPr wrap="square" lIns="25400" tIns="25400" rIns="25400" bIns="25400" anchor="t" anchorCtr="0">
+            <a:spAutoFit/>
+          </a:bodyPr>
+          <a:lstStyle>
+            <a:lvl1pPr algn="l">
+              <a:lnSpc>
+                <a:spcPct val="90000"/>
+              </a:lnSpc>
+              <a:defRPr sz="2400">
+                <a:solidFill>
+                  <a:srgbClr val="8DA6C0"/>
+                </a:solidFill>
+                <a:latin typeface="+mj-lt"/>
+                <a:ea typeface="+mj-ea"/>
+                <a:cs typeface="+mj-cs"/>
+                <a:sym typeface="Open Sans"/>
+              </a:defRPr>
+            </a:lvl1pPr>
+          </a:lstStyle>
+          <a:p>
+            <a:pPr algn="ctr" fontAlgn="base">
+              <a:lnSpc>
+                <a:spcPct val="150000"/>
+              </a:lnSpc>
+            </a:pPr>
+            <a:r>
+              <a:rPr lang="en-US" dirty="0">
+                <a:solidFill>
+                  <a:schemeClr val="tx1"/>
+                </a:solidFill>
+                <a:latin typeface="+mj-ea"/>
+                <a:hlinkClick r:id="rId5"/>
+              </a:rPr>
+              <a:t>https://github.com/jianchentech/PythonLesson/blob/master/pythonProject/BeginnerProject/patternPrinter.md</a:t>
+            </a:r>
+            <a:endParaRPr lang="en-US" dirty="0">
+              <a:solidFill>
+                <a:schemeClr val="tx1"/>
+              </a:solidFill>
+              <a:latin typeface="+mj-ea"/>
+            </a:endParaRPr>
+          </a:p>
+          <a:p>
+            <a:pPr algn="ctr" fontAlgn="base">
+              <a:lnSpc>
+                <a:spcPct val="150000"/>
+              </a:lnSpc>
+            </a:pPr>
+            <a:endParaRPr lang="en-US" dirty="0">
+              <a:solidFill>
+                <a:schemeClr val="tx1"/>
+              </a:solidFill>
+              <a:latin typeface="+mj-ea"/>
+            </a:endParaRPr>
+          </a:p>
+          <a:p>
+            <a:pPr algn="ctr" fontAlgn="base">
+              <a:lnSpc>
+                <a:spcPct val="150000"/>
+              </a:lnSpc>
+            </a:pPr>
+            <a:r>
+              <a:rPr lang="en-US" altLang="en-US" sz="3600" i="1" dirty="0">
+                <a:solidFill>
+                  <a:srgbClr val="FF0000"/>
+                </a:solidFill>
+                <a:latin typeface="Arial Unicode MS"/>
+                <a:ea typeface="JetBrains Mono"/>
+              </a:rPr>
+              <a:t>Deadline: January 16 12:00PM, 2021</a:t>
+            </a:r>
+            <a:endParaRPr lang="en-US" altLang="en-US" sz="3600" dirty="0">
+              <a:solidFill>
+                <a:srgbClr val="FF0000"/>
+              </a:solidFill>
+              <a:latin typeface="Arial" panose="020B0604020202020204" pitchFamily="34" charset="0"/>
+            </a:endParaRPr>
+          </a:p>
+          <a:p>
+            <a:pPr algn="ctr" fontAlgn="base">
+              <a:lnSpc>
+                <a:spcPct val="150000"/>
+              </a:lnSpc>
+            </a:pPr>
+            <a:endParaRPr lang="en-US" dirty="0">
+              <a:solidFill>
+                <a:schemeClr val="tx1"/>
+              </a:solidFill>
+              <a:latin typeface="+mj-ea"/>
+            </a:endParaRPr>
+          </a:p>
+        </p:txBody>
+      </p:sp>
+      <p:sp>
+        <p:nvSpPr>
+          <p:cNvPr id="6" name="标题 1">
+            <a:extLst>
+              <a:ext uri="{FF2B5EF4-FFF2-40B4-BE49-F238E27FC236}">
+                <a16:creationId xmlns:a16="http://schemas.microsoft.com/office/drawing/2014/main" id="{E6E67618-524D-4FF7-91DB-B06DA412D84F}"/>
+              </a:ext>
+            </a:extLst>
+          </p:cNvPr>
+          <p:cNvSpPr>
+            <a:spLocks noGrp="1"/>
+          </p:cNvSpPr>
+          <p:nvPr>
+            <p:ph type="title"/>
+            <p:custDataLst>
+              <p:tags r:id="rId2"/>
+            </p:custDataLst>
+          </p:nvPr>
+        </p:nvSpPr>
+        <p:spPr>
+          <a:xfrm>
+            <a:off x="1216163" y="428910"/>
+            <a:ext cx="8580979" cy="535531"/>
+          </a:xfrm>
+        </p:spPr>
+        <p:txBody>
+          <a:bodyPr/>
+          <a:lstStyle/>
+          <a:p>
+            <a:r>
+              <a:rPr lang="en-US" altLang="zh-CN" dirty="0">
+                <a:latin typeface="+mj-ea"/>
+                <a:ea typeface="+mj-ea"/>
+              </a:rPr>
+              <a:t>Project – Pattern Printer</a:t>
+            </a:r>
+            <a:endParaRPr lang="zh-CN" altLang="en-US" dirty="0">
+              <a:latin typeface="+mj-ea"/>
+              <a:ea typeface="+mj-ea"/>
+            </a:endParaRPr>
+          </a:p>
+        </p:txBody>
+      </p:sp>
+    </p:spTree>
+    <p:extLst>
+      <p:ext uri="{BB962C8B-B14F-4D97-AF65-F5344CB8AC3E}">
+        <p14:creationId xmlns:p14="http://schemas.microsoft.com/office/powerpoint/2010/main" val="2653236748"/>
+      </p:ext>
+    </p:extLst>
+  </p:cSld>
+  <p:clrMapOvr>
+    <a:masterClrMapping/>
+  </p:clrMapOvr>
+  <mc:AlternateContent xmlns:mc="http://schemas.openxmlformats.org/markup-compatibility/2006" xmlns:p14="http://schemas.microsoft.com/office/powerpoint/2010/main">
+    <mc:Choice Requires="p14">
+      <p:transition spd="slow" p14:dur="1200">
+        <p14:prism/>
+      </p:transition>
+    </mc:Choice>
+    <mc:Fallback xmlns="">
+      <p:transition spd="slow">
+        <p:fade/>
+      </p:transition>
+    </mc:Fallback>
+  </mc:AlternateContent>
+  <p:timing>
+    <p:tnLst>
+      <p:par>
+        <p:cTn id="1" dur="indefinite" restart="never" nodeType="tmRoot">
+          <p:childTnLst>
+            <p:seq concurrent="1" nextAc="seek">
+              <p:cTn id="2" dur="indefinite" nodeType="mainSeq">
+                <p:childTnLst>
+                  <p:par>
+                    <p:cTn id="3" fill="hold">
+                      <p:stCondLst>
+                        <p:cond delay="indefinite"/>
+                        <p:cond evt="onBegin" delay="0">
+                          <p:tn val="2"/>
+                        </p:cond>
+                      </p:stCondLst>
+                      <p:childTnLst>
+                        <p:par>
+                          <p:cTn id="4" fill="hold">
+                            <p:stCondLst>
+                              <p:cond delay="0"/>
+                            </p:stCondLst>
+                            <p:childTnLst>
+                              <p:par>
+                                <p:cTn id="5" presetID="2" presetClass="entr" presetSubtype="2" decel="100000" fill="hold" grpId="0" nodeType="withEffect">
+                                  <p:stCondLst>
+                                    <p:cond delay="250"/>
+                                  </p:stCondLst>
+                                  <p:childTnLst>
+                                    <p:set>
+                                      <p:cBhvr>
+                                        <p:cTn id="6" dur="1" fill="hold">
+                                          <p:stCondLst>
+                                            <p:cond delay="0"/>
+                                          </p:stCondLst>
+                                        </p:cTn>
+                                        <p:tgtEl>
+                                          <p:spTgt spid="4"/>
+                                        </p:tgtEl>
+                                        <p:attrNameLst>
+                                          <p:attrName>style.visibility</p:attrName>
+                                        </p:attrNameLst>
+                                      </p:cBhvr>
+                                      <p:to>
+                                        <p:strVal val="visible"/>
+                                      </p:to>
+                                    </p:set>
+                                    <p:anim calcmode="lin" valueType="num">
+                                      <p:cBhvr additive="base">
+                                        <p:cTn id="7" dur="750" fill="hold"/>
+                                        <p:tgtEl>
+                                          <p:spTgt spid="4"/>
+                                        </p:tgtEl>
+                                        <p:attrNameLst>
+                                          <p:attrName>ppt_x</p:attrName>
+                                        </p:attrNameLst>
+                                      </p:cBhvr>
+                                      <p:tavLst>
+                                        <p:tav tm="0">
+                                          <p:val>
+                                            <p:strVal val="1+#ppt_w/2"/>
+                                          </p:val>
+                                        </p:tav>
+                                        <p:tav tm="100000">
+                                          <p:val>
+                                            <p:strVal val="#ppt_x"/>
+                                          </p:val>
+                                        </p:tav>
+                                      </p:tavLst>
+                                    </p:anim>
+                                    <p:anim calcmode="lin" valueType="num">
+                                      <p:cBhvr additive="base">
+                                        <p:cTn id="8" dur="750" fill="hold"/>
+                                        <p:tgtEl>
+                                          <p:spTgt spid="4"/>
+                                        </p:tgtEl>
+                                        <p:attrNameLst>
+                                          <p:attrName>ppt_y</p:attrName>
+                                        </p:attrNameLst>
+                                      </p:cBhvr>
+                                      <p:tavLst>
+                                        <p:tav tm="0">
+                                          <p:val>
+                                            <p:strVal val="#ppt_y"/>
+                                          </p:val>
+                                        </p:tav>
+                                        <p:tav tm="100000">
+                                          <p:val>
+                                            <p:strVal val="#ppt_y"/>
+                                          </p:val>
+                                        </p:tav>
+                                      </p:tavLst>
+                                    </p:anim>
+                                  </p:childTnLst>
+                                </p:cTn>
+                              </p:par>
+                            </p:childTnLst>
+                          </p:cTn>
+                        </p:par>
+                      </p:childTnLst>
+                    </p:cTn>
+                  </p:par>
+                </p:childTnLst>
+              </p:cTn>
+              <p:prevCondLst>
+                <p:cond evt="onPrev" delay="0">
+                  <p:tgtEl>
+                    <p:sldTgt/>
+                  </p:tgtEl>
+                </p:cond>
+              </p:prevCondLst>
+              <p:nextCondLst>
+                <p:cond evt="onNext" delay="0">
+                  <p:tgtEl>
+                    <p:sldTgt/>
+                  </p:tgtEl>
+                </p:cond>
+              </p:nextCondLst>
+            </p:seq>
+          </p:childTnLst>
+        </p:cTn>
+      </p:par>
+    </p:tnLst>
+    <p:bldLst>
+      <p:bldP spid="4" grpId="0" animBg="1"/>
+    </p:bldLst>
+  </p:timing>
+</p:sld>
+</file>
+
+<file path=ppt/slides/slide18.xml><?xml version="1.0" encoding="utf-8"?>
 <p:sld xmlns:a="http://schemas.openxmlformats.org/drawingml/2006/main" xmlns:r="http://schemas.openxmlformats.org/officeDocument/2006/relationships" xmlns:p="http://schemas.openxmlformats.org/presentationml/2006/main">
   <p:cSld>
     <p:spTree>
@@ -33607,8 +34036,8 @@
       </p:transition>
     </mc:Fallback>
   </mc:AlternateContent>
-  <mc:AlternateContent xmlns:mc="http://schemas.openxmlformats.org/markup-compatibility/2006">
-    <mc:Choice xmlns:p14="http://schemas.microsoft.com/office/powerpoint/2010/main" Requires="p14">
+  <mc:AlternateContent xmlns:mc="http://schemas.openxmlformats.org/markup-compatibility/2006" xmlns:p14="http://schemas.microsoft.com/office/powerpoint/2010/main">
+    <mc:Choice Requires="p14">
       <p:timing>
         <p:tnLst>
           <p:par>
@@ -34269,7 +34698,7 @@
         </p:bldLst>
       </p:timing>
     </mc:Choice>
-    <mc:Fallback>
+    <mc:Fallback xmlns="">
       <p:timing>
         <p:tnLst>
           <p:par>
@@ -35020,7 +35449,7 @@
           </a:ln>
           <a:extLst>
             <a:ext uri="{C572A759-6A51-4108-AA02-DFA0A04FC94B}">
-              <ma14:wrappingTextBoxFlag xmlns="" xmlns:ma14="http://schemas.microsoft.com/office/mac/drawingml/2011/main" val="1"/>
+              <ma14:wrappingTextBoxFlag xmlns:ma14="http://schemas.microsoft.com/office/mac/drawingml/2011/main" xmlns="" val="1"/>
             </a:ext>
           </a:extLst>
         </p:spPr>
@@ -37604,7 +38033,7 @@
           </a:ln>
           <a:extLst>
             <a:ext uri="{C572A759-6A51-4108-AA02-DFA0A04FC94B}">
-              <ma14:wrappingTextBoxFlag xmlns="" xmlns:ma14="http://schemas.microsoft.com/office/mac/drawingml/2011/main" val="1"/>
+              <ma14:wrappingTextBoxFlag xmlns:ma14="http://schemas.microsoft.com/office/mac/drawingml/2011/main" xmlns="" val="1"/>
             </a:ext>
           </a:extLst>
         </p:spPr>
@@ -38211,7 +38640,7 @@
           </a:ln>
           <a:extLst>
             <a:ext uri="{C572A759-6A51-4108-AA02-DFA0A04FC94B}">
-              <ma14:wrappingTextBoxFlag xmlns="" xmlns:ma14="http://schemas.microsoft.com/office/mac/drawingml/2011/main" val="1"/>
+              <ma14:wrappingTextBoxFlag xmlns:ma14="http://schemas.microsoft.com/office/mac/drawingml/2011/main" xmlns="" val="1"/>
             </a:ext>
           </a:extLst>
         </p:spPr>
@@ -38479,7 +38908,7 @@
           </a:ln>
           <a:extLst>
             <a:ext uri="{C572A759-6A51-4108-AA02-DFA0A04FC94B}">
-              <ma14:wrappingTextBoxFlag xmlns="" xmlns:ma14="http://schemas.microsoft.com/office/mac/drawingml/2011/main" val="1"/>
+              <ma14:wrappingTextBoxFlag xmlns:ma14="http://schemas.microsoft.com/office/mac/drawingml/2011/main" xmlns="" val="1"/>
             </a:ext>
           </a:extLst>
         </p:spPr>
@@ -38990,7 +39419,7 @@
           </a:ln>
           <a:extLst>
             <a:ext uri="{C572A759-6A51-4108-AA02-DFA0A04FC94B}">
-              <ma14:wrappingTextBoxFlag xmlns="" xmlns:ma14="http://schemas.microsoft.com/office/mac/drawingml/2011/main" val="1"/>
+              <ma14:wrappingTextBoxFlag xmlns:ma14="http://schemas.microsoft.com/office/mac/drawingml/2011/main" xmlns="" val="1"/>
             </a:ext>
           </a:extLst>
         </p:spPr>
@@ -39542,70 +39971,70 @@
 <file path=ppt/tags/tag100.xml><?xml version="1.0" encoding="utf-8"?>
 <p:tagLst xmlns:a="http://schemas.openxmlformats.org/drawingml/2006/main" xmlns:r="http://schemas.openxmlformats.org/officeDocument/2006/relationships" xmlns:p="http://schemas.openxmlformats.org/presentationml/2006/main">
   <p:tag name="PA" val="v4.1.3"/>
-  <p:tag name="NUM" val="16"/>
+  <p:tag name="NUM" val="14"/>
 </p:tagLst>
 </file>
 
 <file path=ppt/tags/tag101.xml><?xml version="1.0" encoding="utf-8"?>
 <p:tagLst xmlns:a="http://schemas.openxmlformats.org/drawingml/2006/main" xmlns:r="http://schemas.openxmlformats.org/officeDocument/2006/relationships" xmlns:p="http://schemas.openxmlformats.org/presentationml/2006/main">
   <p:tag name="PA" val="v4.1.3"/>
-  <p:tag name="NUM" val="17"/>
+  <p:tag name="NUM" val="15"/>
 </p:tagLst>
 </file>
 
 <file path=ppt/tags/tag102.xml><?xml version="1.0" encoding="utf-8"?>
 <p:tagLst xmlns:a="http://schemas.openxmlformats.org/drawingml/2006/main" xmlns:r="http://schemas.openxmlformats.org/officeDocument/2006/relationships" xmlns:p="http://schemas.openxmlformats.org/presentationml/2006/main">
   <p:tag name="PA" val="v4.1.3"/>
-  <p:tag name="NUM" val="18"/>
+  <p:tag name="NUM" val="16"/>
 </p:tagLst>
 </file>
 
 <file path=ppt/tags/tag103.xml><?xml version="1.0" encoding="utf-8"?>
 <p:tagLst xmlns:a="http://schemas.openxmlformats.org/drawingml/2006/main" xmlns:r="http://schemas.openxmlformats.org/officeDocument/2006/relationships" xmlns:p="http://schemas.openxmlformats.org/presentationml/2006/main">
   <p:tag name="PA" val="v4.1.3"/>
-  <p:tag name="NUM" val="19"/>
+  <p:tag name="NUM" val="17"/>
 </p:tagLst>
 </file>
 
 <file path=ppt/tags/tag104.xml><?xml version="1.0" encoding="utf-8"?>
 <p:tagLst xmlns:a="http://schemas.openxmlformats.org/drawingml/2006/main" xmlns:r="http://schemas.openxmlformats.org/officeDocument/2006/relationships" xmlns:p="http://schemas.openxmlformats.org/presentationml/2006/main">
   <p:tag name="PA" val="v4.1.3"/>
-  <p:tag name="NUM" val="20"/>
+  <p:tag name="NUM" val="18"/>
 </p:tagLst>
 </file>
 
 <file path=ppt/tags/tag105.xml><?xml version="1.0" encoding="utf-8"?>
 <p:tagLst xmlns:a="http://schemas.openxmlformats.org/drawingml/2006/main" xmlns:r="http://schemas.openxmlformats.org/officeDocument/2006/relationships" xmlns:p="http://schemas.openxmlformats.org/presentationml/2006/main">
   <p:tag name="PA" val="v4.1.3"/>
-  <p:tag name="NUM" val="21"/>
+  <p:tag name="NUM" val="19"/>
 </p:tagLst>
 </file>
 
 <file path=ppt/tags/tag106.xml><?xml version="1.0" encoding="utf-8"?>
 <p:tagLst xmlns:a="http://schemas.openxmlformats.org/drawingml/2006/main" xmlns:r="http://schemas.openxmlformats.org/officeDocument/2006/relationships" xmlns:p="http://schemas.openxmlformats.org/presentationml/2006/main">
   <p:tag name="PA" val="v4.1.3"/>
-  <p:tag name="NUM" val="22"/>
+  <p:tag name="NUM" val="20"/>
 </p:tagLst>
 </file>
 
 <file path=ppt/tags/tag107.xml><?xml version="1.0" encoding="utf-8"?>
 <p:tagLst xmlns:a="http://schemas.openxmlformats.org/drawingml/2006/main" xmlns:r="http://schemas.openxmlformats.org/officeDocument/2006/relationships" xmlns:p="http://schemas.openxmlformats.org/presentationml/2006/main">
   <p:tag name="PA" val="v4.1.3"/>
-  <p:tag name="NUM" val="23"/>
+  <p:tag name="NUM" val="21"/>
 </p:tagLst>
 </file>
 
 <file path=ppt/tags/tag108.xml><?xml version="1.0" encoding="utf-8"?>
 <p:tagLst xmlns:a="http://schemas.openxmlformats.org/drawingml/2006/main" xmlns:r="http://schemas.openxmlformats.org/officeDocument/2006/relationships" xmlns:p="http://schemas.openxmlformats.org/presentationml/2006/main">
   <p:tag name="PA" val="v4.1.3"/>
-  <p:tag name="NUM" val="24"/>
+  <p:tag name="NUM" val="22"/>
 </p:tagLst>
 </file>
 
 <file path=ppt/tags/tag109.xml><?xml version="1.0" encoding="utf-8"?>
 <p:tagLst xmlns:a="http://schemas.openxmlformats.org/drawingml/2006/main" xmlns:r="http://schemas.openxmlformats.org/officeDocument/2006/relationships" xmlns:p="http://schemas.openxmlformats.org/presentationml/2006/main">
   <p:tag name="PA" val="v4.1.3"/>
-  <p:tag name="NUM" val="25"/>
+  <p:tag name="NUM" val="23"/>
 </p:tagLst>
 </file>
 
@@ -39619,39 +40048,53 @@
 <file path=ppt/tags/tag110.xml><?xml version="1.0" encoding="utf-8"?>
 <p:tagLst xmlns:a="http://schemas.openxmlformats.org/drawingml/2006/main" xmlns:r="http://schemas.openxmlformats.org/officeDocument/2006/relationships" xmlns:p="http://schemas.openxmlformats.org/presentationml/2006/main">
   <p:tag name="PA" val="v4.1.3"/>
-  <p:tag name="NUM" val="26"/>
+  <p:tag name="NUM" val="24"/>
 </p:tagLst>
 </file>
 
 <file path=ppt/tags/tag111.xml><?xml version="1.0" encoding="utf-8"?>
 <p:tagLst xmlns:a="http://schemas.openxmlformats.org/drawingml/2006/main" xmlns:r="http://schemas.openxmlformats.org/officeDocument/2006/relationships" xmlns:p="http://schemas.openxmlformats.org/presentationml/2006/main">
   <p:tag name="PA" val="v4.1.3"/>
-  <p:tag name="NUM" val="27"/>
+  <p:tag name="NUM" val="25"/>
 </p:tagLst>
 </file>
 
 <file path=ppt/tags/tag112.xml><?xml version="1.0" encoding="utf-8"?>
 <p:tagLst xmlns:a="http://schemas.openxmlformats.org/drawingml/2006/main" xmlns:r="http://schemas.openxmlformats.org/officeDocument/2006/relationships" xmlns:p="http://schemas.openxmlformats.org/presentationml/2006/main">
   <p:tag name="PA" val="v4.1.3"/>
-  <p:tag name="NUM" val="28"/>
+  <p:tag name="NUM" val="26"/>
 </p:tagLst>
 </file>
 
 <file path=ppt/tags/tag113.xml><?xml version="1.0" encoding="utf-8"?>
 <p:tagLst xmlns:a="http://schemas.openxmlformats.org/drawingml/2006/main" xmlns:r="http://schemas.openxmlformats.org/officeDocument/2006/relationships" xmlns:p="http://schemas.openxmlformats.org/presentationml/2006/main">
   <p:tag name="PA" val="v4.1.3"/>
-  <p:tag name="NUM" val="29"/>
+  <p:tag name="NUM" val="27"/>
 </p:tagLst>
 </file>
 
 <file path=ppt/tags/tag114.xml><?xml version="1.0" encoding="utf-8"?>
 <p:tagLst xmlns:a="http://schemas.openxmlformats.org/drawingml/2006/main" xmlns:r="http://schemas.openxmlformats.org/officeDocument/2006/relationships" xmlns:p="http://schemas.openxmlformats.org/presentationml/2006/main">
   <p:tag name="PA" val="v4.1.3"/>
+  <p:tag name="NUM" val="28"/>
+</p:tagLst>
+</file>
+
+<file path=ppt/tags/tag115.xml><?xml version="1.0" encoding="utf-8"?>
+<p:tagLst xmlns:a="http://schemas.openxmlformats.org/drawingml/2006/main" xmlns:r="http://schemas.openxmlformats.org/officeDocument/2006/relationships" xmlns:p="http://schemas.openxmlformats.org/presentationml/2006/main">
+  <p:tag name="PA" val="v4.1.3"/>
+  <p:tag name="NUM" val="29"/>
+</p:tagLst>
+</file>
+
+<file path=ppt/tags/tag116.xml><?xml version="1.0" encoding="utf-8"?>
+<p:tagLst xmlns:a="http://schemas.openxmlformats.org/drawingml/2006/main" xmlns:r="http://schemas.openxmlformats.org/officeDocument/2006/relationships" xmlns:p="http://schemas.openxmlformats.org/presentationml/2006/main">
+  <p:tag name="PA" val="v4.1.3"/>
   <p:tag name="NUM" val="30"/>
 </p:tagLst>
 </file>
 
-<file path=ppt/tags/tag115.xml><?xml version="1.0" encoding="utf-8"?>
+<file path=ppt/tags/tag117.xml><?xml version="1.0" encoding="utf-8"?>
 <p:tagLst xmlns:a="http://schemas.openxmlformats.org/drawingml/2006/main" xmlns:r="http://schemas.openxmlformats.org/officeDocument/2006/relationships" xmlns:p="http://schemas.openxmlformats.org/presentationml/2006/main">
   <p:tag name="PA" val="v4.1.3"/>
   <p:tag name="NUM" val="31"/>
@@ -40171,36 +40614,34 @@
 
 <file path=ppt/tags/tag85.xml><?xml version="1.0" encoding="utf-8"?>
 <p:tagLst xmlns:a="http://schemas.openxmlformats.org/drawingml/2006/main" xmlns:r="http://schemas.openxmlformats.org/officeDocument/2006/relationships" xmlns:p="http://schemas.openxmlformats.org/presentationml/2006/main">
+  <p:tag name="NUM" val="10"/>
+</p:tagLst>
+</file>
+
+<file path=ppt/tags/tag86.xml><?xml version="1.0" encoding="utf-8"?>
+<p:tagLst xmlns:a="http://schemas.openxmlformats.org/drawingml/2006/main" xmlns:r="http://schemas.openxmlformats.org/officeDocument/2006/relationships" xmlns:p="http://schemas.openxmlformats.org/presentationml/2006/main">
+  <p:tag name="NUM" val="3"/>
+</p:tagLst>
+</file>
+
+<file path=ppt/tags/tag87.xml><?xml version="1.0" encoding="utf-8"?>
+<p:tagLst xmlns:a="http://schemas.openxmlformats.org/drawingml/2006/main" xmlns:r="http://schemas.openxmlformats.org/officeDocument/2006/relationships" xmlns:p="http://schemas.openxmlformats.org/presentationml/2006/main">
   <p:tag name="PA" val="v4.1.3"/>
   <p:tag name="NUM" val="1"/>
 </p:tagLst>
 </file>
 
-<file path=ppt/tags/tag86.xml><?xml version="1.0" encoding="utf-8"?>
+<file path=ppt/tags/tag88.xml><?xml version="1.0" encoding="utf-8"?>
 <p:tagLst xmlns:a="http://schemas.openxmlformats.org/drawingml/2006/main" xmlns:r="http://schemas.openxmlformats.org/officeDocument/2006/relationships" xmlns:p="http://schemas.openxmlformats.org/presentationml/2006/main">
   <p:tag name="PA" val="v4.1.3"/>
   <p:tag name="NUM" val="2"/>
 </p:tagLst>
 </file>
 
-<file path=ppt/tags/tag87.xml><?xml version="1.0" encoding="utf-8"?>
+<file path=ppt/tags/tag89.xml><?xml version="1.0" encoding="utf-8"?>
 <p:tagLst xmlns:a="http://schemas.openxmlformats.org/drawingml/2006/main" xmlns:r="http://schemas.openxmlformats.org/officeDocument/2006/relationships" xmlns:p="http://schemas.openxmlformats.org/presentationml/2006/main">
   <p:tag name="PA" val="v4.1.3"/>
   <p:tag name="NUM" val="3"/>
-</p:tagLst>
-</file>
-
-<file path=ppt/tags/tag88.xml><?xml version="1.0" encoding="utf-8"?>
-<p:tagLst xmlns:a="http://schemas.openxmlformats.org/drawingml/2006/main" xmlns:r="http://schemas.openxmlformats.org/officeDocument/2006/relationships" xmlns:p="http://schemas.openxmlformats.org/presentationml/2006/main">
-  <p:tag name="PA" val="v4.1.3"/>
-  <p:tag name="NUM" val="4"/>
-</p:tagLst>
-</file>
-
-<file path=ppt/tags/tag89.xml><?xml version="1.0" encoding="utf-8"?>
-<p:tagLst xmlns:a="http://schemas.openxmlformats.org/drawingml/2006/main" xmlns:r="http://schemas.openxmlformats.org/officeDocument/2006/relationships" xmlns:p="http://schemas.openxmlformats.org/presentationml/2006/main">
-  <p:tag name="PA" val="v4.1.3"/>
-  <p:tag name="NUM" val="5"/>
 </p:tagLst>
 </file>
 
@@ -40214,70 +40655,70 @@
 <file path=ppt/tags/tag90.xml><?xml version="1.0" encoding="utf-8"?>
 <p:tagLst xmlns:a="http://schemas.openxmlformats.org/drawingml/2006/main" xmlns:r="http://schemas.openxmlformats.org/officeDocument/2006/relationships" xmlns:p="http://schemas.openxmlformats.org/presentationml/2006/main">
   <p:tag name="PA" val="v4.1.3"/>
-  <p:tag name="NUM" val="6"/>
+  <p:tag name="NUM" val="4"/>
 </p:tagLst>
 </file>
 
 <file path=ppt/tags/tag91.xml><?xml version="1.0" encoding="utf-8"?>
 <p:tagLst xmlns:a="http://schemas.openxmlformats.org/drawingml/2006/main" xmlns:r="http://schemas.openxmlformats.org/officeDocument/2006/relationships" xmlns:p="http://schemas.openxmlformats.org/presentationml/2006/main">
   <p:tag name="PA" val="v4.1.3"/>
-  <p:tag name="NUM" val="7"/>
+  <p:tag name="NUM" val="5"/>
 </p:tagLst>
 </file>
 
 <file path=ppt/tags/tag92.xml><?xml version="1.0" encoding="utf-8"?>
 <p:tagLst xmlns:a="http://schemas.openxmlformats.org/drawingml/2006/main" xmlns:r="http://schemas.openxmlformats.org/officeDocument/2006/relationships" xmlns:p="http://schemas.openxmlformats.org/presentationml/2006/main">
   <p:tag name="PA" val="v4.1.3"/>
-  <p:tag name="NUM" val="8"/>
+  <p:tag name="NUM" val="6"/>
 </p:tagLst>
 </file>
 
 <file path=ppt/tags/tag93.xml><?xml version="1.0" encoding="utf-8"?>
 <p:tagLst xmlns:a="http://schemas.openxmlformats.org/drawingml/2006/main" xmlns:r="http://schemas.openxmlformats.org/officeDocument/2006/relationships" xmlns:p="http://schemas.openxmlformats.org/presentationml/2006/main">
   <p:tag name="PA" val="v4.1.3"/>
-  <p:tag name="NUM" val="9"/>
+  <p:tag name="NUM" val="7"/>
 </p:tagLst>
 </file>
 
 <file path=ppt/tags/tag94.xml><?xml version="1.0" encoding="utf-8"?>
 <p:tagLst xmlns:a="http://schemas.openxmlformats.org/drawingml/2006/main" xmlns:r="http://schemas.openxmlformats.org/officeDocument/2006/relationships" xmlns:p="http://schemas.openxmlformats.org/presentationml/2006/main">
   <p:tag name="PA" val="v4.1.3"/>
-  <p:tag name="NUM" val="10"/>
+  <p:tag name="NUM" val="8"/>
 </p:tagLst>
 </file>
 
 <file path=ppt/tags/tag95.xml><?xml version="1.0" encoding="utf-8"?>
 <p:tagLst xmlns:a="http://schemas.openxmlformats.org/drawingml/2006/main" xmlns:r="http://schemas.openxmlformats.org/officeDocument/2006/relationships" xmlns:p="http://schemas.openxmlformats.org/presentationml/2006/main">
   <p:tag name="PA" val="v4.1.3"/>
-  <p:tag name="NUM" val="11"/>
+  <p:tag name="NUM" val="9"/>
 </p:tagLst>
 </file>
 
 <file path=ppt/tags/tag96.xml><?xml version="1.0" encoding="utf-8"?>
 <p:tagLst xmlns:a="http://schemas.openxmlformats.org/drawingml/2006/main" xmlns:r="http://schemas.openxmlformats.org/officeDocument/2006/relationships" xmlns:p="http://schemas.openxmlformats.org/presentationml/2006/main">
   <p:tag name="PA" val="v4.1.3"/>
-  <p:tag name="NUM" val="12"/>
+  <p:tag name="NUM" val="10"/>
 </p:tagLst>
 </file>
 
 <file path=ppt/tags/tag97.xml><?xml version="1.0" encoding="utf-8"?>
 <p:tagLst xmlns:a="http://schemas.openxmlformats.org/drawingml/2006/main" xmlns:r="http://schemas.openxmlformats.org/officeDocument/2006/relationships" xmlns:p="http://schemas.openxmlformats.org/presentationml/2006/main">
   <p:tag name="PA" val="v4.1.3"/>
-  <p:tag name="NUM" val="13"/>
+  <p:tag name="NUM" val="11"/>
 </p:tagLst>
 </file>
 
 <file path=ppt/tags/tag98.xml><?xml version="1.0" encoding="utf-8"?>
 <p:tagLst xmlns:a="http://schemas.openxmlformats.org/drawingml/2006/main" xmlns:r="http://schemas.openxmlformats.org/officeDocument/2006/relationships" xmlns:p="http://schemas.openxmlformats.org/presentationml/2006/main">
   <p:tag name="PA" val="v4.1.3"/>
-  <p:tag name="NUM" val="14"/>
+  <p:tag name="NUM" val="12"/>
 </p:tagLst>
 </file>
 
 <file path=ppt/tags/tag99.xml><?xml version="1.0" encoding="utf-8"?>
 <p:tagLst xmlns:a="http://schemas.openxmlformats.org/drawingml/2006/main" xmlns:r="http://schemas.openxmlformats.org/officeDocument/2006/relationships" xmlns:p="http://schemas.openxmlformats.org/presentationml/2006/main">
   <p:tag name="PA" val="v4.1.3"/>
-  <p:tag name="NUM" val="15"/>
+  <p:tag name="NUM" val="13"/>
 </p:tagLst>
 </file>
 

</xml_diff>